<commit_message>
Fixes on Neural Network weights
</commit_message>
<xml_diff>
--- a/presentation.pptx
+++ b/presentation.pptx
@@ -214,7 +214,7 @@
           <a:p>
             <a:fld id="{439984CF-8456-4B48-B076-D98EB683EED0}" type="datetimeFigureOut">
               <a:rPr lang="it-IT" smtClean="0"/>
-              <a:t>22/11/2012</a:t>
+              <a:t>23/11/2012</a:t>
             </a:fld>
             <a:endParaRPr lang="it-IT"/>
           </a:p>
@@ -838,7 +838,7 @@
           <a:p>
             <a:fld id="{BF936EAF-A2C7-4229-B0E9-A642D04707BE}" type="datetimeFigureOut">
               <a:rPr lang="it-IT" smtClean="0"/>
-              <a:t>22/11/2012</a:t>
+              <a:t>23/11/2012</a:t>
             </a:fld>
             <a:endParaRPr lang="it-IT"/>
           </a:p>
@@ -1038,7 +1038,7 @@
           <a:p>
             <a:fld id="{BF936EAF-A2C7-4229-B0E9-A642D04707BE}" type="datetimeFigureOut">
               <a:rPr lang="it-IT" smtClean="0"/>
-              <a:t>22/11/2012</a:t>
+              <a:t>23/11/2012</a:t>
             </a:fld>
             <a:endParaRPr lang="it-IT"/>
           </a:p>
@@ -1213,7 +1213,7 @@
           <a:p>
             <a:fld id="{BF936EAF-A2C7-4229-B0E9-A642D04707BE}" type="datetimeFigureOut">
               <a:rPr lang="it-IT" smtClean="0"/>
-              <a:t>22/11/2012</a:t>
+              <a:t>23/11/2012</a:t>
             </a:fld>
             <a:endParaRPr lang="it-IT"/>
           </a:p>
@@ -1378,7 +1378,7 @@
           <a:p>
             <a:fld id="{BF936EAF-A2C7-4229-B0E9-A642D04707BE}" type="datetimeFigureOut">
               <a:rPr lang="it-IT" smtClean="0"/>
-              <a:t>22/11/2012</a:t>
+              <a:t>23/11/2012</a:t>
             </a:fld>
             <a:endParaRPr lang="it-IT"/>
           </a:p>
@@ -1626,7 +1626,7 @@
           <a:p>
             <a:fld id="{BF936EAF-A2C7-4229-B0E9-A642D04707BE}" type="datetimeFigureOut">
               <a:rPr lang="it-IT" smtClean="0"/>
-              <a:t>22/11/2012</a:t>
+              <a:t>23/11/2012</a:t>
             </a:fld>
             <a:endParaRPr lang="it-IT"/>
           </a:p>
@@ -1944,7 +1944,7 @@
           <a:p>
             <a:fld id="{BF936EAF-A2C7-4229-B0E9-A642D04707BE}" type="datetimeFigureOut">
               <a:rPr lang="it-IT" smtClean="0"/>
-              <a:t>22/11/2012</a:t>
+              <a:t>23/11/2012</a:t>
             </a:fld>
             <a:endParaRPr lang="it-IT"/>
           </a:p>
@@ -2410,7 +2410,7 @@
           <a:p>
             <a:fld id="{BF936EAF-A2C7-4229-B0E9-A642D04707BE}" type="datetimeFigureOut">
               <a:rPr lang="it-IT" smtClean="0"/>
-              <a:t>22/11/2012</a:t>
+              <a:t>23/11/2012</a:t>
             </a:fld>
             <a:endParaRPr lang="it-IT"/>
           </a:p>
@@ -2558,7 +2558,7 @@
           <a:p>
             <a:fld id="{BF936EAF-A2C7-4229-B0E9-A642D04707BE}" type="datetimeFigureOut">
               <a:rPr lang="it-IT" smtClean="0"/>
-              <a:t>22/11/2012</a:t>
+              <a:t>23/11/2012</a:t>
             </a:fld>
             <a:endParaRPr lang="it-IT"/>
           </a:p>
@@ -2648,7 +2648,7 @@
           <a:p>
             <a:fld id="{BF936EAF-A2C7-4229-B0E9-A642D04707BE}" type="datetimeFigureOut">
               <a:rPr lang="it-IT" smtClean="0"/>
-              <a:t>22/11/2012</a:t>
+              <a:t>23/11/2012</a:t>
             </a:fld>
             <a:endParaRPr lang="it-IT"/>
           </a:p>
@@ -2922,7 +2922,7 @@
           <a:p>
             <a:fld id="{BF936EAF-A2C7-4229-B0E9-A642D04707BE}" type="datetimeFigureOut">
               <a:rPr lang="it-IT" smtClean="0"/>
-              <a:t>22/11/2012</a:t>
+              <a:t>23/11/2012</a:t>
             </a:fld>
             <a:endParaRPr lang="it-IT"/>
           </a:p>
@@ -3227,7 +3227,7 @@
           <a:p>
             <a:fld id="{BF936EAF-A2C7-4229-B0E9-A642D04707BE}" type="datetimeFigureOut">
               <a:rPr lang="it-IT" smtClean="0"/>
-              <a:t>22/11/2012</a:t>
+              <a:t>23/11/2012</a:t>
             </a:fld>
             <a:endParaRPr lang="it-IT"/>
           </a:p>
@@ -3525,7 +3525,7 @@
           <a:p>
             <a:fld id="{BF936EAF-A2C7-4229-B0E9-A642D04707BE}" type="datetimeFigureOut">
               <a:rPr lang="it-IT" smtClean="0"/>
-              <a:t>22/11/2012</a:t>
+              <a:t>23/11/2012</a:t>
             </a:fld>
             <a:endParaRPr lang="it-IT"/>
           </a:p>
@@ -4186,31 +4186,35 @@
             </a:r>
             <a:r>
               <a:rPr lang="it-IT" dirty="0" smtClean="0"/>
+              <a:t> or the input </a:t>
+            </a:r>
+            <a:r>
+              <a:rPr lang="it-IT" dirty="0" err="1" smtClean="0"/>
+              <a:t>obtained</a:t>
+            </a:r>
+            <a:r>
+              <a:rPr lang="it-IT" dirty="0" smtClean="0"/>
+              <a:t> from the </a:t>
+            </a:r>
+            <a:r>
+              <a:rPr lang="it-IT" dirty="0" err="1" smtClean="0"/>
+              <a:t>agent's</a:t>
+            </a:r>
+            <a:r>
+              <a:rPr lang="it-IT" dirty="0" smtClean="0"/>
               <a:t> </a:t>
             </a:r>
             <a:r>
-              <a:rPr lang="it-IT" dirty="0" smtClean="0"/>
-              <a:t>or </a:t>
-            </a:r>
-            <a:r>
-              <a:rPr lang="it-IT" dirty="0" smtClean="0"/>
-              <a:t>the input </a:t>
-            </a:r>
-            <a:r>
-              <a:rPr lang="it-IT" dirty="0" err="1" smtClean="0"/>
-              <a:t>obtained</a:t>
-            </a:r>
-            <a:r>
-              <a:rPr lang="it-IT" dirty="0" smtClean="0"/>
-              <a:t> from </a:t>
-            </a:r>
-            <a:r>
-              <a:rPr lang="it-IT" dirty="0" smtClean="0"/>
-              <a:t>the </a:t>
-            </a:r>
-            <a:r>
-              <a:rPr lang="it-IT" dirty="0" err="1" smtClean="0"/>
-              <a:t>agent's</a:t>
+              <a:rPr lang="it-IT" dirty="0" err="1" smtClean="0"/>
+              <a:t>sensors</a:t>
+            </a:r>
+            <a:r>
+              <a:rPr lang="it-IT" dirty="0" smtClean="0"/>
+              <a:t>, </a:t>
+            </a:r>
+            <a:r>
+              <a:rPr lang="it-IT" dirty="0" err="1" smtClean="0"/>
+              <a:t>properly</a:t>
             </a:r>
             <a:r>
               <a:rPr lang="it-IT" dirty="0" smtClean="0"/>
@@ -4218,35 +4222,11 @@
             </a:r>
             <a:r>
               <a:rPr lang="it-IT" dirty="0" err="1" smtClean="0"/>
-              <a:t>sensors</a:t>
-            </a:r>
-            <a:r>
-              <a:rPr lang="it-IT" dirty="0" smtClean="0"/>
-              <a:t>,</a:t>
-            </a:r>
-            <a:r>
-              <a:rPr lang="it-IT" dirty="0" smtClean="0"/>
-              <a:t> </a:t>
-            </a:r>
-            <a:r>
-              <a:rPr lang="it-IT" dirty="0" err="1" smtClean="0"/>
-              <a:t>properly</a:t>
-            </a:r>
-            <a:r>
-              <a:rPr lang="it-IT" dirty="0" smtClean="0"/>
-              <a:t> </a:t>
-            </a:r>
-            <a:r>
-              <a:rPr lang="it-IT" dirty="0" err="1" smtClean="0"/>
               <a:t>discretized</a:t>
             </a:r>
             <a:r>
               <a:rPr lang="it-IT" dirty="0" smtClean="0"/>
               <a:t>.</a:t>
-            </a:r>
-            <a:r>
-              <a:rPr lang="it-IT" dirty="0" smtClean="0"/>
-              <a:t/>
             </a:r>
             <a:br>
               <a:rPr lang="it-IT" dirty="0" smtClean="0"/>
@@ -5402,11 +5382,7 @@
             </a:r>
             <a:r>
               <a:rPr lang="it-IT" dirty="0" smtClean="0"/>
-              <a:t> to the right output</a:t>
-            </a:r>
-            <a:r>
-              <a:rPr lang="it-IT" dirty="0" smtClean="0"/>
-              <a:t>.</a:t>
+              <a:t> to the right output.</a:t>
             </a:r>
           </a:p>
           <a:p>
@@ -5728,11 +5704,11 @@
   <p:clrMapOvr>
     <a:masterClrMapping/>
   </p:clrMapOvr>
-  <mc:AlternateContent xmlns:mc="http://schemas.openxmlformats.org/markup-compatibility/2006">
-    <mc:Choice xmlns:p14="http://schemas.microsoft.com/office/powerpoint/2010/main" Requires="p14">
+  <mc:AlternateContent xmlns:mc="http://schemas.openxmlformats.org/markup-compatibility/2006" xmlns:p14="http://schemas.microsoft.com/office/powerpoint/2010/main">
+    <mc:Choice Requires="p14">
       <p:transition spd="slow" p14:dur="2000"/>
     </mc:Choice>
-    <mc:Fallback>
+    <mc:Fallback xmlns="">
       <p:transition spd="slow"/>
     </mc:Fallback>
   </mc:AlternateContent>
@@ -5987,7 +5963,6 @@
               <a:rPr lang="it-IT" dirty="0"/>
               <a:t>!</a:t>
             </a:r>
-            <a:endParaRPr lang="it-IT" dirty="0"/>
           </a:p>
           <a:p>
             <a:pPr algn="ctr"/>
@@ -6771,7 +6746,6 @@
               <a:rPr lang="it-IT" dirty="0"/>
               <a:t>3</a:t>
             </a:r>
-            <a:endParaRPr lang="it-IT" dirty="0"/>
           </a:p>
         </p:txBody>
       </p:sp>
@@ -6809,7 +6783,6 @@
               <a:rPr lang="it-IT" dirty="0"/>
               <a:t>6</a:t>
             </a:r>
-            <a:endParaRPr lang="it-IT" dirty="0"/>
           </a:p>
         </p:txBody>
       </p:sp>
@@ -6884,7 +6857,6 @@
               <a:rPr lang="it-IT" dirty="0"/>
               <a:t>4</a:t>
             </a:r>
-            <a:endParaRPr lang="it-IT" dirty="0"/>
           </a:p>
         </p:txBody>
       </p:sp>
@@ -6922,7 +6894,6 @@
               <a:rPr lang="it-IT" dirty="0"/>
               <a:t>5</a:t>
             </a:r>
-            <a:endParaRPr lang="it-IT" dirty="0"/>
           </a:p>
         </p:txBody>
       </p:sp>
@@ -6960,7 +6931,6 @@
               <a:rPr lang="it-IT" dirty="0"/>
               <a:t>7</a:t>
             </a:r>
-            <a:endParaRPr lang="it-IT" dirty="0"/>
           </a:p>
         </p:txBody>
       </p:sp>
@@ -7281,7 +7251,6 @@
               <a:rPr lang="it-IT" dirty="0"/>
               <a:t>3</a:t>
             </a:r>
-            <a:endParaRPr lang="it-IT" dirty="0"/>
           </a:p>
         </p:txBody>
       </p:sp>
@@ -7319,7 +7288,6 @@
               <a:rPr lang="it-IT" dirty="0"/>
               <a:t>6</a:t>
             </a:r>
-            <a:endParaRPr lang="it-IT" dirty="0"/>
           </a:p>
         </p:txBody>
       </p:sp>
@@ -7394,7 +7362,6 @@
               <a:rPr lang="it-IT" dirty="0"/>
               <a:t>4</a:t>
             </a:r>
-            <a:endParaRPr lang="it-IT" dirty="0"/>
           </a:p>
         </p:txBody>
       </p:sp>
@@ -7432,7 +7399,6 @@
               <a:rPr lang="it-IT" dirty="0"/>
               <a:t>5</a:t>
             </a:r>
-            <a:endParaRPr lang="it-IT" dirty="0"/>
           </a:p>
         </p:txBody>
       </p:sp>
@@ -7470,7 +7436,6 @@
               <a:rPr lang="it-IT" dirty="0"/>
               <a:t>7</a:t>
             </a:r>
-            <a:endParaRPr lang="it-IT" dirty="0"/>
           </a:p>
         </p:txBody>
       </p:sp>
@@ -7879,7 +7844,6 @@
               <a:rPr lang="it-IT" dirty="0"/>
               <a:t>3</a:t>
             </a:r>
-            <a:endParaRPr lang="it-IT" dirty="0"/>
           </a:p>
         </p:txBody>
       </p:sp>
@@ -7917,7 +7881,6 @@
               <a:rPr lang="it-IT" dirty="0"/>
               <a:t>6</a:t>
             </a:r>
-            <a:endParaRPr lang="it-IT" dirty="0"/>
           </a:p>
         </p:txBody>
       </p:sp>
@@ -7992,7 +7955,6 @@
               <a:rPr lang="it-IT" dirty="0"/>
               <a:t>4</a:t>
             </a:r>
-            <a:endParaRPr lang="it-IT" dirty="0"/>
           </a:p>
         </p:txBody>
       </p:sp>
@@ -8030,7 +7992,6 @@
               <a:rPr lang="it-IT" dirty="0"/>
               <a:t>5</a:t>
             </a:r>
-            <a:endParaRPr lang="it-IT" dirty="0"/>
           </a:p>
         </p:txBody>
       </p:sp>
@@ -8068,7 +8029,6 @@
               <a:rPr lang="it-IT" dirty="0"/>
               <a:t>7</a:t>
             </a:r>
-            <a:endParaRPr lang="it-IT" dirty="0"/>
           </a:p>
         </p:txBody>
       </p:sp>
@@ -9298,7 +9258,6 @@
                 <a:rPr lang="it-IT" dirty="0"/>
                 <a:t>7</a:t>
               </a:r>
-              <a:endParaRPr lang="it-IT" dirty="0"/>
             </a:p>
           </p:txBody>
         </p:sp>
@@ -9388,7 +9347,6 @@
                 <a:rPr lang="it-IT" dirty="0"/>
                 <a:t>2</a:t>
               </a:r>
-              <a:endParaRPr lang="it-IT" dirty="0"/>
             </a:p>
           </p:txBody>
         </p:sp>
@@ -9567,7 +9525,6 @@
                 <a:rPr lang="it-IT" dirty="0"/>
                 <a:t>2</a:t>
               </a:r>
-              <a:endParaRPr lang="it-IT" dirty="0"/>
             </a:p>
           </p:txBody>
         </p:sp>
@@ -10128,34 +10085,26 @@
             </a:r>
             <a:r>
               <a:rPr lang="it-IT" dirty="0" smtClean="0"/>
+              <a:t> networks</a:t>
+            </a:r>
+          </a:p>
+          <a:p>
+            <a:pPr lvl="1"/>
+            <a:r>
+              <a:rPr lang="it-IT" dirty="0" err="1" smtClean="0"/>
+              <a:t>Different</a:t>
+            </a:r>
+            <a:r>
+              <a:rPr lang="it-IT" dirty="0" smtClean="0"/>
               <a:t> </a:t>
             </a:r>
             <a:r>
-              <a:rPr lang="it-IT" dirty="0" smtClean="0"/>
-              <a:t>networks</a:t>
-            </a:r>
-          </a:p>
-          <a:p>
-            <a:pPr lvl="1"/>
-            <a:r>
-              <a:rPr lang="it-IT" dirty="0" err="1" smtClean="0"/>
-              <a:t>Different</a:t>
-            </a:r>
-            <a:r>
-              <a:rPr lang="it-IT" dirty="0" smtClean="0"/>
-              <a:t> </a:t>
-            </a:r>
-            <a:r>
               <a:rPr lang="it-IT" dirty="0" err="1" smtClean="0"/>
               <a:t>kinds</a:t>
             </a:r>
             <a:r>
               <a:rPr lang="it-IT" dirty="0" smtClean="0"/>
               <a:t> of networks</a:t>
-            </a:r>
-            <a:r>
-              <a:rPr lang="it-IT" dirty="0" smtClean="0"/>
-              <a:t/>
             </a:r>
             <a:br>
               <a:rPr lang="it-IT" dirty="0" smtClean="0"/>
@@ -10215,7 +10164,6 @@
               <a:rPr lang="it-IT" dirty="0" smtClean="0"/>
               <a:t> a new generation</a:t>
             </a:r>
-            <a:endParaRPr lang="it-IT" dirty="0" smtClean="0"/>
           </a:p>
           <a:p>
             <a:pPr lvl="1"/>
@@ -10350,11 +10298,11 @@
             </a:r>
             <a:r>
               <a:rPr lang="it-IT" dirty="0" smtClean="0"/>
-              <a:t>. A </a:t>
-            </a:r>
-            <a:r>
-              <a:rPr lang="it-IT" dirty="0" err="1" smtClean="0"/>
-              <a:t>better</a:t>
+              <a:t>. </a:t>
+            </a:r>
+            <a:r>
+              <a:rPr lang="it-IT" dirty="0" err="1" smtClean="0"/>
+              <a:t>We</a:t>
             </a:r>
             <a:r>
               <a:rPr lang="it-IT" dirty="0" smtClean="0"/>
@@ -10362,52 +10310,33 @@
             </a:r>
             <a:r>
               <a:rPr lang="it-IT" dirty="0" err="1" smtClean="0"/>
-              <a:t>known</a:t>
+              <a:t>will</a:t>
+            </a:r>
+            <a:r>
+              <a:rPr lang="it-IT" dirty="0" smtClean="0"/>
+              <a:t> call </a:t>
+            </a:r>
+            <a:r>
+              <a:rPr lang="it-IT" dirty="0" err="1" smtClean="0"/>
+              <a:t>it</a:t>
             </a:r>
             <a:r>
               <a:rPr lang="it-IT" dirty="0" smtClean="0"/>
               <a:t> </a:t>
             </a:r>
             <a:r>
-              <a:rPr lang="it-IT" dirty="0" err="1" smtClean="0"/>
-              <a:t>name</a:t>
-            </a:r>
-            <a:r>
-              <a:rPr lang="it-IT" dirty="0" smtClean="0"/>
-              <a:t> for </a:t>
-            </a:r>
-            <a:r>
-              <a:rPr lang="it-IT" dirty="0" err="1" smtClean="0"/>
-              <a:t>this</a:t>
-            </a:r>
-            <a:r>
-              <a:rPr lang="it-IT" dirty="0" smtClean="0"/>
-              <a:t> </a:t>
-            </a:r>
-            <a:r>
-              <a:rPr lang="it-IT" dirty="0" err="1" smtClean="0"/>
-              <a:t>number</a:t>
-            </a:r>
-            <a:r>
-              <a:rPr lang="it-IT" dirty="0" smtClean="0"/>
-              <a:t> </a:t>
-            </a:r>
-            <a:r>
-              <a:rPr lang="it-IT" dirty="0" err="1" smtClean="0"/>
-              <a:t>is</a:t>
-            </a:r>
-            <a:r>
-              <a:rPr lang="it-IT" dirty="0" smtClean="0"/>
-              <a:t> </a:t>
-            </a:r>
-            <a:r>
               <a:rPr lang="it-IT" i="1" dirty="0" smtClean="0"/>
-              <a:t>fitness</a:t>
+              <a:t>fitness </a:t>
+            </a:r>
+            <a:r>
+              <a:rPr lang="it-IT" i="1" dirty="0" err="1" smtClean="0"/>
+              <a:t>value</a:t>
             </a:r>
             <a:r>
               <a:rPr lang="it-IT" dirty="0" smtClean="0"/>
               <a:t>.</a:t>
             </a:r>
+            <a:endParaRPr lang="it-IT" dirty="0" smtClean="0"/>
           </a:p>
           <a:p>
             <a:endParaRPr lang="it-IT" i="1" dirty="0"/>
@@ -10822,14 +10751,14 @@
                 <a:latin typeface="Consolas" pitchFamily="49" charset="0"/>
                 <a:cs typeface="Consolas" pitchFamily="49" charset="0"/>
               </a:rPr>
-              <a:t>	Go </a:t>
-            </a:r>
-            <a:r>
-              <a:rPr lang="en-US" sz="1600" dirty="0">
+              <a:t>	</a:t>
+            </a:r>
+            <a:r>
+              <a:rPr lang="en-US" sz="1600" dirty="0" smtClean="0">
                 <a:latin typeface="Consolas" pitchFamily="49" charset="0"/>
                 <a:cs typeface="Consolas" pitchFamily="49" charset="0"/>
               </a:rPr>
-              <a:t>through the population and sum </a:t>
+              <a:t>Re-sum </a:t>
             </a:r>
             <a:r>
               <a:rPr lang="en-US" sz="1600" dirty="0" err="1" smtClean="0">
@@ -10843,8 +10772,19 @@
                 <a:latin typeface="Consolas" pitchFamily="49" charset="0"/>
                 <a:cs typeface="Consolas" pitchFamily="49" charset="0"/>
               </a:rPr>
-              <a:t> in S'</a:t>
-            </a:r>
+              <a:t> in S</a:t>
+            </a:r>
+            <a:r>
+              <a:rPr lang="en-US" sz="1600" dirty="0" smtClean="0">
+                <a:latin typeface="Consolas" pitchFamily="49" charset="0"/>
+                <a:cs typeface="Consolas" pitchFamily="49" charset="0"/>
+              </a:rPr>
+              <a:t>' for each chromosome</a:t>
+            </a:r>
+            <a:endParaRPr lang="en-US" sz="1600" dirty="0" smtClean="0">
+              <a:latin typeface="Consolas" pitchFamily="49" charset="0"/>
+              <a:cs typeface="Consolas" pitchFamily="49" charset="0"/>
+            </a:endParaRPr>
           </a:p>
           <a:p>
             <a:pPr marL="342900" indent="-342900">
@@ -10856,7 +10796,14 @@
                 <a:latin typeface="Consolas" pitchFamily="49" charset="0"/>
                 <a:cs typeface="Consolas" pitchFamily="49" charset="0"/>
               </a:rPr>
-              <a:t>Return the chromosome where you are</a:t>
+              <a:t>Return the </a:t>
+            </a:r>
+            <a:r>
+              <a:rPr lang="en-US" sz="1600" dirty="0" smtClean="0">
+                <a:latin typeface="Consolas" pitchFamily="49" charset="0"/>
+                <a:cs typeface="Consolas" pitchFamily="49" charset="0"/>
+              </a:rPr>
+              <a:t>last accessed chromosome</a:t>
             </a:r>
             <a:endParaRPr lang="it-IT" sz="1600" dirty="0">
               <a:latin typeface="Consolas" pitchFamily="49" charset="0"/>
@@ -10918,8 +10865,8 @@
           <a:lstStyle/>
           <a:p>
             <a:r>
-              <a:rPr lang="it-IT" dirty="0" err="1" smtClean="0"/>
-              <a:t>Recombination</a:t>
+              <a:rPr lang="it-IT" dirty="0" smtClean="0"/>
+              <a:t>Crossover</a:t>
             </a:r>
             <a:endParaRPr lang="it-IT" dirty="0"/>
           </a:p>
@@ -10941,8 +10888,20 @@
           <a:lstStyle/>
           <a:p>
             <a:r>
-              <a:rPr lang="it-IT" dirty="0" err="1" smtClean="0"/>
-              <a:t>Recombination</a:t>
+              <a:rPr lang="it-IT" dirty="0" smtClean="0"/>
+              <a:t>Crossover </a:t>
+            </a:r>
+            <a:r>
+              <a:rPr lang="it-IT" dirty="0" err="1" smtClean="0"/>
+              <a:t>is</a:t>
+            </a:r>
+            <a:r>
+              <a:rPr lang="it-IT" dirty="0" smtClean="0"/>
+              <a:t> the </a:t>
+            </a:r>
+            <a:r>
+              <a:rPr lang="it-IT" dirty="0" err="1" smtClean="0"/>
+              <a:t>recombination</a:t>
             </a:r>
             <a:r>
               <a:rPr lang="it-IT" dirty="0" smtClean="0"/>
@@ -10950,6 +10909,14 @@
             </a:r>
             <a:r>
               <a:rPr lang="it-IT" dirty="0" err="1" smtClean="0"/>
+              <a:t>method</a:t>
+            </a:r>
+            <a:r>
+              <a:rPr lang="it-IT" dirty="0" smtClean="0"/>
+              <a:t> </a:t>
+            </a:r>
+            <a:r>
+              <a:rPr lang="it-IT" dirty="0" err="1" smtClean="0"/>
               <a:t>between</a:t>
             </a:r>
             <a:r>
@@ -10967,38 +10934,6 @@
             <a:r>
               <a:rPr lang="it-IT" dirty="0" err="1" smtClean="0"/>
               <a:t>chromosomes</a:t>
-            </a:r>
-            <a:r>
-              <a:rPr lang="it-IT" dirty="0" smtClean="0"/>
-              <a:t> </a:t>
-            </a:r>
-            <a:r>
-              <a:rPr lang="it-IT" dirty="0" err="1" smtClean="0"/>
-              <a:t>is</a:t>
-            </a:r>
-            <a:r>
-              <a:rPr lang="it-IT" dirty="0" smtClean="0"/>
-              <a:t> </a:t>
-            </a:r>
-            <a:r>
-              <a:rPr lang="it-IT" dirty="0" err="1" smtClean="0"/>
-              <a:t>done</a:t>
-            </a:r>
-            <a:r>
-              <a:rPr lang="it-IT" dirty="0" smtClean="0"/>
-              <a:t> with the so </a:t>
-            </a:r>
-            <a:r>
-              <a:rPr lang="it-IT" dirty="0" err="1" smtClean="0"/>
-              <a:t>called</a:t>
-            </a:r>
-            <a:r>
-              <a:rPr lang="it-IT" dirty="0" smtClean="0"/>
-              <a:t> </a:t>
-            </a:r>
-            <a:r>
-              <a:rPr lang="it-IT" i="1" dirty="0" smtClean="0"/>
-              <a:t>crossover</a:t>
             </a:r>
             <a:r>
               <a:rPr lang="it-IT" dirty="0" smtClean="0"/>
@@ -11830,11 +11765,7 @@
           <a:p>
             <a:r>
               <a:rPr lang="en-US" sz="2000" dirty="0" smtClean="0"/>
-              <a:t>For our purposes, we can simplified this action as a sum of those inputs </a:t>
-            </a:r>
-            <a:r>
-              <a:rPr lang="en-US" sz="2000" dirty="0" smtClean="0"/>
-              <a:t>values, each one multiplied by an "importance factor", called </a:t>
+              <a:t>For our purposes, we can simplified this action as a sum of those inputs values, each one multiplied by an "importance factor", called </a:t>
             </a:r>
             <a:r>
               <a:rPr lang="en-US" sz="2000" i="1" dirty="0" smtClean="0"/>
@@ -11842,11 +11773,7 @@
             </a:r>
             <a:r>
               <a:rPr lang="en-US" sz="2000" dirty="0" smtClean="0"/>
-              <a:t>. Then</a:t>
-            </a:r>
-            <a:r>
-              <a:rPr lang="en-US" sz="2000" dirty="0" smtClean="0"/>
-              <a:t>, if this sum is greater than a </a:t>
+              <a:t>. Then, if this sum is greater than a </a:t>
             </a:r>
             <a:r>
               <a:rPr lang="en-US" sz="2000" b="1" dirty="0" smtClean="0"/>
@@ -12502,8 +12429,8 @@
           </a:p>
         </p:txBody>
       </p:sp>
-      <mc:AlternateContent xmlns:mc="http://schemas.openxmlformats.org/markup-compatibility/2006">
-        <mc:Choice xmlns:a14="http://schemas.microsoft.com/office/drawing/2010/main" Requires="a14">
+      <mc:AlternateContent xmlns:mc="http://schemas.openxmlformats.org/markup-compatibility/2006" xmlns:a14="http://schemas.microsoft.com/office/drawing/2010/main">
+        <mc:Choice Requires="a14">
           <p:sp>
             <p:nvSpPr>
               <p:cNvPr id="3" name="Segnaposto contenuto 2"/>
@@ -12710,11 +12637,7 @@
                 </a:r>
                 <a:r>
                   <a:rPr lang="it-IT" dirty="0" smtClean="0"/>
-                  <a:t> </a:t>
-                </a:r>
-                <a:r>
-                  <a:rPr lang="it-IT" dirty="0" smtClean="0"/>
-                  <a:t>input for </a:t>
+                  <a:t> input for </a:t>
                 </a:r>
                 <a14:m>
                   <m:oMath xmlns:m="http://schemas.openxmlformats.org/officeDocument/2006/math">
@@ -12790,11 +12713,7 @@
                 </a:r>
                 <a:r>
                   <a:rPr lang="it-IT" dirty="0" smtClean="0"/>
-                  <a:t> </a:t>
-                </a:r>
-                <a:r>
-                  <a:rPr lang="it-IT" dirty="0" smtClean="0"/>
-                  <a:t>the </a:t>
+                  <a:t> the </a:t>
                 </a:r>
                 <a:r>
                   <a:rPr lang="it-IT" dirty="0" err="1" smtClean="0"/>
@@ -12814,11 +12733,7 @@
                 </a:r>
                 <a:r>
                   <a:rPr lang="it-IT" dirty="0" smtClean="0"/>
-                  <a:t> </a:t>
-                </a:r>
-                <a:r>
-                  <a:rPr lang="it-IT" dirty="0" smtClean="0"/>
-                  <a:t>input for </a:t>
+                  <a:t> input for </a:t>
                 </a:r>
                 <a14:m>
                   <m:oMath xmlns:m="http://schemas.openxmlformats.org/officeDocument/2006/math">
@@ -12895,7 +12810,6 @@
                   <a:rPr lang="it-IT" dirty="0" smtClean="0"/>
                   <a:t>: </a:t>
                 </a:r>
-                <a:endParaRPr lang="it-IT" dirty="0" smtClean="0"/>
               </a:p>
               <a:p>
                 <a:pPr marL="0" indent="0" algn="ctr">
@@ -12907,11 +12821,7 @@
                 </a:r>
                 <a:r>
                   <a:rPr lang="it-IT" sz="2400" i="1" dirty="0" smtClean="0"/>
-                  <a:t> </a:t>
-                </a:r>
-                <a:r>
-                  <a:rPr lang="it-IT" sz="2400" i="1" dirty="0" smtClean="0"/>
-                  <a:t>(a &gt; </a:t>
+                  <a:t> (a &gt; </a:t>
                 </a:r>
                 <a:r>
                   <a:rPr lang="it-IT" sz="2400" i="1" dirty="0" err="1" smtClean="0"/>
@@ -13026,7 +12936,7 @@
             </p:txBody>
           </p:sp>
         </mc:Choice>
-        <mc:Fallback>
+        <mc:Fallback xmlns="">
           <p:sp>
             <p:nvSpPr>
               <p:cNvPr id="3" name="Segnaposto contenuto 2"/>

</xml_diff>